<commit_message>
zpsTW ns SSEWS INTRO SCREEJ
</commit_message>
<xml_diff>
--- a/lib/covidapp/Assets/Long_Covid_App_Poster.pptx
+++ b/lib/covidapp/Assets/Long_Covid_App_Poster.pptx
@@ -239,7 +239,7 @@
             <a:fld id="{58467270-D8F1-4898-95C1-7E69E31A334E}" type="datetimeFigureOut">
               <a:rPr lang="de-DE" smtClean="0"/>
               <a:pPr/>
-              <a:t>22.03.22</a:t>
+              <a:t>19.05.2022</a:t>
             </a:fld>
             <a:endParaRPr lang="en-GB"/>
           </a:p>
@@ -1820,8 +1820,8 @@
         </p:nvSpPr>
         <p:spPr bwMode="auto">
           <a:xfrm>
-            <a:off x="18700057" y="15762797"/>
-            <a:ext cx="10678077" cy="25299649"/>
+            <a:off x="18700057" y="15067558"/>
+            <a:ext cx="10678077" cy="26530756"/>
           </a:xfrm>
           <a:prstGeom prst="rect">
             <a:avLst/>
@@ -2003,7 +2003,7 @@
             </a:pPr>
             <a:r>
               <a:rPr lang="de-AT" sz="4000" i="0" dirty="0"/>
-              <a:t>Anhand der WHO-Publikationen wurden die am häufigsten auftretenden Symptome analysiert. Einige Übungen, die diese Symptome lindern können, wurden in der App implementiert. </a:t>
+              <a:t>Anhand der WHO- und RKI-Publikationen wurden die am häufigsten auftretenden Symptome analysiert. Einige Übungen, die diese Symptome durch messbare Werte abbilden, wurden in der App implementiert. </a:t>
             </a:r>
           </a:p>
           <a:p>
@@ -2025,7 +2025,7 @@
             </a:pPr>
             <a:r>
               <a:rPr lang="de-AT" sz="4000" i="0" dirty="0"/>
-              <a:t>Die App bietet Patienten Funktionen zur Analyse und Behandlung der am häufigsten auftretenden Symptome (Atemübungen, Pulsmessung). Zudem können Patienten täglich einen Fragebogen ausfüllen und Rückmeldung  zu ihrem emotionalen und physischen Gesundheitszustand erhalten. Anhand eines digitalen Tagebuchs werden diese Daten gespeichert und grafisch dargestellt. Somit kann der Patient seinen Genesungsverlauf täglich verfolgen. </a:t>
+              <a:t>Die App bietet Patienten Funktionen zur Analyse und Überwachung  der am häufigsten auftretenden Symptome (Atemübungen, Pulsmessung, Symptomtracking). Zudem können Patienten täglich einen Fragebogen ausfüllen und Rückmeldung  zu ihrem emotionalen und physischen Gesundheitszustand erhalten. Anhand eines digitalen Tagebuchs werden diese Daten gespeichert und grafisch dargestellt. Somit kann der Patient seinen Genesungsverlauf täglich verfolgen. </a:t>
             </a:r>
           </a:p>
           <a:p>
@@ -2401,7 +2401,7 @@
             </a:pPr>
             <a:r>
               <a:rPr lang="de-AT" sz="4000" b="1" i="0" dirty="0"/>
-              <a:t>References</a:t>
+              <a:t>Referenzen</a:t>
             </a:r>
           </a:p>
           <a:p>
@@ -2423,49 +2423,41 @@
             </a:r>
             <a:r>
               <a:rPr lang="de-AT" sz="3200" dirty="0"/>
-              <a:t>.). </a:t>
+              <a:t>.). abgerufen März 22, 2022, von https://www.rki.de/SharedDocs/FAQ/NCOV2019/FAQ_Liste_Gesundheitliche_Langzeitfolgen.html </a:t>
+            </a:r>
+          </a:p>
+          <a:p>
+            <a:r>
+              <a:rPr lang="de-AT" sz="3200" dirty="0"/>
+              <a:t>World </a:t>
             </a:r>
             <a:r>
               <a:rPr lang="de-AT" sz="3200" dirty="0" err="1"/>
-              <a:t>Retrieved</a:t>
-            </a:r>
-            <a:r>
-              <a:rPr lang="de-AT" sz="3200" dirty="0"/>
-              <a:t> March 22, 2022, von https://</a:t>
-            </a:r>
-            <a:r>
-              <a:rPr lang="de-AT" sz="3200" dirty="0" err="1"/>
-              <a:t>www.rki.de</a:t>
-            </a:r>
-            <a:r>
-              <a:rPr lang="de-AT" sz="3200" dirty="0"/>
-              <a:t>/</a:t>
-            </a:r>
-            <a:r>
-              <a:rPr lang="de-AT" sz="3200" dirty="0" err="1"/>
-              <a:t>SharedDocs</a:t>
-            </a:r>
-            <a:r>
-              <a:rPr lang="de-AT" sz="3200" dirty="0"/>
-              <a:t>/FAQ/NCOV2019/</a:t>
-            </a:r>
-            <a:r>
-              <a:rPr lang="de-AT" sz="3200" dirty="0" err="1"/>
-              <a:t>FAQ_Liste_Gesundheitliche_Langzeitfolgen.html</a:t>
+              <a:t>Health</a:t>
             </a:r>
             <a:r>
               <a:rPr lang="de-AT" sz="3200" dirty="0"/>
               <a:t> </a:t>
             </a:r>
-          </a:p>
-          <a:p>
+            <a:r>
+              <a:rPr lang="de-AT" sz="3200" dirty="0" err="1"/>
+              <a:t>Organization</a:t>
+            </a:r>
             <a:r>
               <a:rPr lang="de-AT" sz="3200" dirty="0"/>
-              <a:t>World </a:t>
+              <a:t>. (</a:t>
             </a:r>
             <a:r>
               <a:rPr lang="de-AT" sz="3200" dirty="0" err="1"/>
-              <a:t>Health</a:t>
+              <a:t>n.d</a:t>
+            </a:r>
+            <a:r>
+              <a:rPr lang="de-AT" sz="3200" dirty="0"/>
+              <a:t>.). A </a:t>
+            </a:r>
+            <a:r>
+              <a:rPr lang="de-AT" sz="3200" dirty="0" err="1"/>
+              <a:t>clinical</a:t>
             </a:r>
             <a:r>
               <a:rPr lang="de-AT" sz="3200" dirty="0"/>
@@ -2473,23 +2465,7 @@
             </a:r>
             <a:r>
               <a:rPr lang="de-AT" sz="3200" dirty="0" err="1"/>
-              <a:t>Organization</a:t>
-            </a:r>
-            <a:r>
-              <a:rPr lang="de-AT" sz="3200" dirty="0"/>
-              <a:t>. (</a:t>
-            </a:r>
-            <a:r>
-              <a:rPr lang="de-AT" sz="3200" dirty="0" err="1"/>
-              <a:t>n.d</a:t>
-            </a:r>
-            <a:r>
-              <a:rPr lang="de-AT" sz="3200" dirty="0"/>
-              <a:t>.). A </a:t>
-            </a:r>
-            <a:r>
-              <a:rPr lang="de-AT" sz="3200" dirty="0" err="1"/>
-              <a:t>clinical</a:t>
+              <a:t>case</a:t>
             </a:r>
             <a:r>
               <a:rPr lang="de-AT" sz="3200" dirty="0"/>
@@ -2497,7 +2473,7 @@
             </a:r>
             <a:r>
               <a:rPr lang="de-AT" sz="3200" dirty="0" err="1"/>
-              <a:t>case</a:t>
+              <a:t>definition</a:t>
             </a:r>
             <a:r>
               <a:rPr lang="de-AT" sz="3200" dirty="0"/>
@@ -2505,7 +2481,7 @@
             </a:r>
             <a:r>
               <a:rPr lang="de-AT" sz="3200" dirty="0" err="1"/>
-              <a:t>definition</a:t>
+              <a:t>of</a:t>
             </a:r>
             <a:r>
               <a:rPr lang="de-AT" sz="3200" dirty="0"/>
@@ -2513,7 +2489,15 @@
             </a:r>
             <a:r>
               <a:rPr lang="de-AT" sz="3200" dirty="0" err="1"/>
-              <a:t>of</a:t>
+              <a:t>post</a:t>
+            </a:r>
+            <a:r>
+              <a:rPr lang="de-AT" sz="3200" dirty="0"/>
+              <a:t> covid-19 </a:t>
+            </a:r>
+            <a:r>
+              <a:rPr lang="de-AT" sz="3200" dirty="0" err="1"/>
+              <a:t>condition</a:t>
             </a:r>
             <a:r>
               <a:rPr lang="de-AT" sz="3200" dirty="0"/>
@@ -2521,22 +2505,6 @@
             </a:r>
             <a:r>
               <a:rPr lang="de-AT" sz="3200" dirty="0" err="1"/>
-              <a:t>post</a:t>
-            </a:r>
-            <a:r>
-              <a:rPr lang="de-AT" sz="3200" dirty="0"/>
-              <a:t> covid-19 </a:t>
-            </a:r>
-            <a:r>
-              <a:rPr lang="de-AT" sz="3200" dirty="0" err="1"/>
-              <a:t>condition</a:t>
-            </a:r>
-            <a:r>
-              <a:rPr lang="de-AT" sz="3200" dirty="0"/>
-              <a:t> </a:t>
-            </a:r>
-            <a:r>
-              <a:rPr lang="de-AT" sz="3200" dirty="0" err="1"/>
               <a:t>by</a:t>
             </a:r>
             <a:r>
@@ -2549,15 +2517,7 @@
             </a:r>
             <a:r>
               <a:rPr lang="de-AT" sz="3200" dirty="0"/>
-              <a:t> 2021. World </a:t>
-            </a:r>
-            <a:r>
-              <a:rPr lang="de-AT" sz="3200" dirty="0" err="1"/>
-              <a:t>Health</a:t>
-            </a:r>
-            <a:r>
-              <a:rPr lang="de-AT" sz="3200" dirty="0"/>
-              <a:t> </a:t>
+              <a:t> 2021. World Health </a:t>
             </a:r>
             <a:r>
               <a:rPr lang="de-AT" sz="3200" dirty="0" err="1"/>
@@ -2565,31 +2525,7 @@
             </a:r>
             <a:r>
               <a:rPr lang="de-AT" sz="3200" dirty="0"/>
-              <a:t>. </a:t>
-            </a:r>
-            <a:r>
-              <a:rPr lang="de-AT" sz="3200" dirty="0" err="1"/>
-              <a:t>Retrieved</a:t>
-            </a:r>
-            <a:r>
-              <a:rPr lang="de-AT" sz="3200" dirty="0"/>
-              <a:t> March 22, 2022, von https://</a:t>
-            </a:r>
-            <a:r>
-              <a:rPr lang="de-AT" sz="3200" dirty="0" err="1"/>
-              <a:t>www.who.int</a:t>
-            </a:r>
-            <a:r>
-              <a:rPr lang="de-AT" sz="3200" dirty="0"/>
-              <a:t>/</a:t>
-            </a:r>
-            <a:r>
-              <a:rPr lang="de-AT" sz="3200" dirty="0" err="1"/>
-              <a:t>publications</a:t>
-            </a:r>
-            <a:r>
-              <a:rPr lang="de-AT" sz="3200" dirty="0"/>
-              <a:t>/i/item/WHO-2019-nCoV-Post_COVID-19_condition-Clinical_case_definition-2021.1 </a:t>
+              <a:t>. abgerufen März 22, 2022, von https://www.who.int/publications/i/item/WHO-2019-nCoV-Post_COVID-19_condition-Clinical_case_definition-2021.1 </a:t>
             </a:r>
           </a:p>
           <a:p>
@@ -2612,7 +2548,7 @@
         </p:nvSpPr>
         <p:spPr bwMode="auto">
           <a:xfrm>
-            <a:off x="815736" y="23987704"/>
+            <a:off x="1178084" y="23987704"/>
             <a:ext cx="8417287" cy="985301"/>
           </a:xfrm>
           <a:prstGeom prst="rect">
@@ -2776,7 +2712,7 @@
         </p:nvSpPr>
         <p:spPr bwMode="auto">
           <a:xfrm>
-            <a:off x="9645008" y="23961949"/>
+            <a:off x="9523363" y="23961949"/>
             <a:ext cx="8570196" cy="985301"/>
           </a:xfrm>
           <a:prstGeom prst="rect">
@@ -2941,7 +2877,7 @@
         </p:nvSpPr>
         <p:spPr bwMode="auto">
           <a:xfrm>
-            <a:off x="869740" y="34676545"/>
+            <a:off x="1142078" y="34676545"/>
             <a:ext cx="8309277" cy="985301"/>
           </a:xfrm>
           <a:prstGeom prst="rect">
@@ -3106,7 +3042,7 @@
         </p:nvSpPr>
         <p:spPr bwMode="auto">
           <a:xfrm>
-            <a:off x="9837703" y="34674866"/>
+            <a:off x="9667379" y="34674866"/>
             <a:ext cx="8309277" cy="985301"/>
           </a:xfrm>
           <a:prstGeom prst="rect">
@@ -3282,7 +3218,7 @@
         </p:blipFill>
         <p:spPr>
           <a:xfrm>
-            <a:off x="9739946" y="25347703"/>
+            <a:off x="9797961" y="25347703"/>
             <a:ext cx="7214234" cy="9248443"/>
           </a:xfrm>
           <a:prstGeom prst="rect">
@@ -3370,8 +3306,8 @@
         </p:blipFill>
         <p:spPr>
           <a:xfrm>
-            <a:off x="1428291" y="25416101"/>
-            <a:ext cx="7091448" cy="9180045"/>
+            <a:off x="1428290" y="25387209"/>
+            <a:ext cx="7113767" cy="9208937"/>
           </a:xfrm>
           <a:prstGeom prst="rect">
             <a:avLst/>

</xml_diff>